<commit_message>
10% Rule Logic - Reduced Noise
Updated with latest logic.
</commit_message>
<xml_diff>
--- a/10% Rule Logic - Reduce Noise.pptx
+++ b/10% Rule Logic - Reduce Noise.pptx
@@ -249,7 +249,7 @@
           <a:p>
             <a:fld id="{5F6F6F96-CC55-4997-970F-086AC92041CD}" type="datetimeFigureOut">
               <a:rPr lang="en-US" smtClean="0"/>
-              <a:t>3/7/2017</a:t>
+              <a:t>3/11/2017</a:t>
             </a:fld>
             <a:endParaRPr lang="en-US"/>
           </a:p>
@@ -417,7 +417,7 @@
           <a:p>
             <a:fld id="{5F6F6F96-CC55-4997-970F-086AC92041CD}" type="datetimeFigureOut">
               <a:rPr lang="en-US" smtClean="0"/>
-              <a:t>3/7/2017</a:t>
+              <a:t>3/11/2017</a:t>
             </a:fld>
             <a:endParaRPr lang="en-US"/>
           </a:p>
@@ -595,7 +595,7 @@
           <a:p>
             <a:fld id="{5F6F6F96-CC55-4997-970F-086AC92041CD}" type="datetimeFigureOut">
               <a:rPr lang="en-US" smtClean="0"/>
-              <a:t>3/7/2017</a:t>
+              <a:t>3/11/2017</a:t>
             </a:fld>
             <a:endParaRPr lang="en-US"/>
           </a:p>
@@ -763,7 +763,7 @@
           <a:p>
             <a:fld id="{5F6F6F96-CC55-4997-970F-086AC92041CD}" type="datetimeFigureOut">
               <a:rPr lang="en-US" smtClean="0"/>
-              <a:t>3/7/2017</a:t>
+              <a:t>3/11/2017</a:t>
             </a:fld>
             <a:endParaRPr lang="en-US"/>
           </a:p>
@@ -1008,7 +1008,7 @@
           <a:p>
             <a:fld id="{5F6F6F96-CC55-4997-970F-086AC92041CD}" type="datetimeFigureOut">
               <a:rPr lang="en-US" smtClean="0"/>
-              <a:t>3/7/2017</a:t>
+              <a:t>3/11/2017</a:t>
             </a:fld>
             <a:endParaRPr lang="en-US"/>
           </a:p>
@@ -1237,7 +1237,7 @@
           <a:p>
             <a:fld id="{5F6F6F96-CC55-4997-970F-086AC92041CD}" type="datetimeFigureOut">
               <a:rPr lang="en-US" smtClean="0"/>
-              <a:t>3/7/2017</a:t>
+              <a:t>3/11/2017</a:t>
             </a:fld>
             <a:endParaRPr lang="en-US"/>
           </a:p>
@@ -1601,7 +1601,7 @@
           <a:p>
             <a:fld id="{5F6F6F96-CC55-4997-970F-086AC92041CD}" type="datetimeFigureOut">
               <a:rPr lang="en-US" smtClean="0"/>
-              <a:t>3/7/2017</a:t>
+              <a:t>3/11/2017</a:t>
             </a:fld>
             <a:endParaRPr lang="en-US"/>
           </a:p>
@@ -1718,7 +1718,7 @@
           <a:p>
             <a:fld id="{5F6F6F96-CC55-4997-970F-086AC92041CD}" type="datetimeFigureOut">
               <a:rPr lang="en-US" smtClean="0"/>
-              <a:t>3/7/2017</a:t>
+              <a:t>3/11/2017</a:t>
             </a:fld>
             <a:endParaRPr lang="en-US"/>
           </a:p>
@@ -1813,7 +1813,7 @@
           <a:p>
             <a:fld id="{5F6F6F96-CC55-4997-970F-086AC92041CD}" type="datetimeFigureOut">
               <a:rPr lang="en-US" smtClean="0"/>
-              <a:t>3/7/2017</a:t>
+              <a:t>3/11/2017</a:t>
             </a:fld>
             <a:endParaRPr lang="en-US"/>
           </a:p>
@@ -2088,7 +2088,7 @@
           <a:p>
             <a:fld id="{5F6F6F96-CC55-4997-970F-086AC92041CD}" type="datetimeFigureOut">
               <a:rPr lang="en-US" smtClean="0"/>
-              <a:t>3/7/2017</a:t>
+              <a:t>3/11/2017</a:t>
             </a:fld>
             <a:endParaRPr lang="en-US"/>
           </a:p>
@@ -2340,7 +2340,7 @@
           <a:p>
             <a:fld id="{5F6F6F96-CC55-4997-970F-086AC92041CD}" type="datetimeFigureOut">
               <a:rPr lang="en-US" smtClean="0"/>
-              <a:t>3/7/2017</a:t>
+              <a:t>3/11/2017</a:t>
             </a:fld>
             <a:endParaRPr lang="en-US"/>
           </a:p>
@@ -2551,7 +2551,7 @@
           <a:p>
             <a:fld id="{5F6F6F96-CC55-4997-970F-086AC92041CD}" type="datetimeFigureOut">
               <a:rPr lang="en-US" smtClean="0"/>
-              <a:t>3/7/2017</a:t>
+              <a:t>3/11/2017</a:t>
             </a:fld>
             <a:endParaRPr lang="en-US"/>
           </a:p>
@@ -7535,8 +7535,8 @@
           </a:fontRef>
         </p:style>
       </p:cxnSp>
-      <mc:AlternateContent xmlns:mc="http://schemas.openxmlformats.org/markup-compatibility/2006">
-        <mc:Choice xmlns:a14="http://schemas.microsoft.com/office/drawing/2010/main" Requires="a14">
+      <mc:AlternateContent xmlns:mc="http://schemas.openxmlformats.org/markup-compatibility/2006" xmlns:a14="http://schemas.microsoft.com/office/drawing/2010/main">
+        <mc:Choice Requires="a14">
           <p:sp>
             <p:nvSpPr>
               <p:cNvPr id="44" name="TextBox 43"/>
@@ -8100,7 +8100,7 @@
             </p:txBody>
           </p:sp>
         </mc:Choice>
-        <mc:Fallback>
+        <mc:Fallback xmlns="">
           <p:sp>
             <p:nvSpPr>
               <p:cNvPr id="44" name="TextBox 43"/>
@@ -8837,7 +8837,7 @@
             <p:spPr>
               <a:xfrm>
                 <a:off x="118513" y="4554665"/>
-                <a:ext cx="11773095" cy="1723549"/>
+                <a:ext cx="12170511" cy="1723549"/>
               </a:xfrm>
               <a:prstGeom prst="rect">
                 <a:avLst/>
@@ -9470,13 +9470,13 @@
                 </a:r>
                 <a:r>
                   <a:rPr lang="en-US" sz="1400" dirty="0"/>
-                  <a:t> time to buy = buy,  cash balance/(1+buy percentage)*local min of value, </a:t>
+                  <a:t> time to buy = buy,  previous day’s cash balance/max(today low,</a:t>
                 </a:r>
               </a:p>
               <a:p>
                 <a:r>
                   <a:rPr lang="en-US" sz="1400" dirty="0"/>
-                  <a:t>else = to previous value</a:t>
+                  <a:t>(1+buy percentage)*local min of value), else = to previous value</a:t>
                 </a:r>
               </a:p>
               <a:p>
@@ -9486,25 +9486,25 @@
                 </a:r>
                 <a:r>
                   <a:rPr lang="en-US" sz="1400" dirty="0"/>
-                  <a:t>shares of stock one row up &gt;0, previous shares * (1-sell percentage)* local max of </a:t>
-                </a:r>
-                <a:r>
-                  <a:rPr lang="en-US" sz="1400" dirty="0" err="1"/>
-                  <a:t>value+cash</a:t>
-                </a:r>
-                <a:r>
-                  <a:rPr lang="en-US" sz="1400" dirty="0"/>
-                  <a:t> value one row up, elseif time</a:t>
+                  <a:t>shares of stock one row up &gt;0, previous shares * min(today’s low,(1-sell percentage)* local max of value)+cash value one row up, </a:t>
                 </a:r>
               </a:p>
               <a:p>
                 <a:r>
-                  <a:rPr lang="en-US" sz="1400" b="0" dirty="0"/>
-                  <a:t>To buy = buy, cash value one row up – shares of stock * (</a:t>
+                  <a:rPr lang="en-US" sz="1400" dirty="0" err="1"/>
+                  <a:t>elseif</a:t>
                 </a:r>
                 <a:r>
                   <a:rPr lang="en-US" sz="1400" dirty="0"/>
-                  <a:t>1+buy percentage)*local min of value</a:t>
+                  <a:t> time t</a:t>
+                </a:r>
+                <a:r>
+                  <a:rPr lang="en-US" sz="1400" b="0" dirty="0"/>
+                  <a:t>o buy = buy, cash value one row up – shares of stock *max(today’s low, (</a:t>
+                </a:r>
+                <a:r>
+                  <a:rPr lang="en-US" sz="1400" dirty="0"/>
+                  <a:t>1+buy percentage)*local min of value)</a:t>
                 </a:r>
                 <a:r>
                   <a:rPr lang="en-US" sz="1400" b="0" dirty="0"/>
@@ -9537,7 +9537,7 @@
             <p:spPr>
               <a:xfrm>
                 <a:off x="118513" y="4554665"/>
-                <a:ext cx="11773095" cy="1723549"/>
+                <a:ext cx="12170511" cy="1723549"/>
               </a:xfrm>
               <a:prstGeom prst="rect">
                 <a:avLst/>
@@ -9545,7 +9545,7 @@
               <a:blipFill>
                 <a:blip r:embed="rId2"/>
                 <a:stretch>
-                  <a:fillRect l="-932" t="-3180" b="-5300"/>
+                  <a:fillRect l="-901" t="-3180" b="-5300"/>
                 </a:stretch>
               </a:blipFill>
             </p:spPr>
@@ -11341,7 +11341,7 @@
             <p:spPr>
               <a:xfrm>
                 <a:off x="118513" y="4266796"/>
-                <a:ext cx="11590930" cy="1600438"/>
+                <a:ext cx="11767067" cy="1600438"/>
               </a:xfrm>
               <a:prstGeom prst="rect">
                 <a:avLst/>
@@ -12046,7 +12046,7 @@
                 </a:r>
                 <a:r>
                   <a:rPr lang="en-US" sz="1300" dirty="0"/>
-                  <a:t> time to buy = buy,  cash balance/(1+buy percentage)*local min of </a:t>
+                  <a:t> time to buy = buy,  cash balance/max(today’s low, (1+buy percentage)*local min of </a:t>
                 </a:r>
                 <a:r>
                   <a:rPr lang="en-US" sz="1300" dirty="0" err="1"/>
@@ -12054,7 +12054,7 @@
                 </a:r>
                 <a:r>
                   <a:rPr lang="en-US" sz="1300" dirty="0"/>
-                  <a:t> low, </a:t>
+                  <a:t> low), </a:t>
                 </a:r>
               </a:p>
               <a:p>
@@ -12070,7 +12070,7 @@
                 </a:r>
                 <a:r>
                   <a:rPr lang="en-US" sz="1300" dirty="0"/>
-                  <a:t>shares of stock one row up &gt;0, previous shares * (1-sell percentage)* local max of </a:t>
+                  <a:t>shares of stock one row up &gt;0, previous shares *min(today’s high, (1-sell percentage)* local max of </a:t>
                 </a:r>
                 <a:r>
                   <a:rPr lang="en-US" sz="1300" dirty="0" err="1"/>
@@ -12078,25 +12078,25 @@
                 </a:r>
                 <a:r>
                   <a:rPr lang="en-US" sz="1300" dirty="0"/>
-                  <a:t> </a:t>
-                </a:r>
-                <a:r>
-                  <a:rPr lang="en-US" sz="1300" dirty="0" err="1"/>
-                  <a:t>high+cash</a:t>
-                </a:r>
-                <a:r>
-                  <a:rPr lang="en-US" sz="1300" dirty="0"/>
-                  <a:t> value one row up, elseif time</a:t>
+                  <a:t> high)+cash value one row up, </a:t>
                 </a:r>
               </a:p>
               <a:p>
                 <a:r>
-                  <a:rPr lang="en-US" sz="1300" b="0" dirty="0"/>
-                  <a:t>To buy = buy, cash value one row up – shares of stock * (</a:t>
+                  <a:rPr lang="en-US" sz="1300" dirty="0" err="1"/>
+                  <a:t>elseif</a:t>
                 </a:r>
                 <a:r>
                   <a:rPr lang="en-US" sz="1300" dirty="0"/>
-                  <a:t>1+buy percentage)*local min of adjust low</a:t>
+                  <a:t> time t</a:t>
+                </a:r>
+                <a:r>
+                  <a:rPr lang="en-US" sz="1300" b="0" dirty="0"/>
+                  <a:t>o buy = buy, cash value one row up – shares of stock * max(today’s low,(</a:t>
+                </a:r>
+                <a:r>
+                  <a:rPr lang="en-US" sz="1300" dirty="0"/>
+                  <a:t>1+buy percentage)*local min of adjust low)</a:t>
                 </a:r>
                 <a:r>
                   <a:rPr lang="en-US" sz="1300" b="0" dirty="0"/>
@@ -12129,7 +12129,7 @@
             <p:spPr>
               <a:xfrm>
                 <a:off x="118513" y="4266796"/>
-                <a:ext cx="11590930" cy="1600438"/>
+                <a:ext cx="11767067" cy="1600438"/>
               </a:xfrm>
               <a:prstGeom prst="rect">
                 <a:avLst/>
@@ -12137,7 +12137,7 @@
               <a:blipFill>
                 <a:blip r:embed="rId2"/>
                 <a:stretch>
-                  <a:fillRect l="-841" t="-3435" b="-5344"/>
+                  <a:fillRect l="-829" t="-3435" b="-5344"/>
                 </a:stretch>
               </a:blipFill>
             </p:spPr>
@@ -13333,7 +13333,7 @@
       </p:sp>
       <p:pic>
         <p:nvPicPr>
-          <p:cNvPr id="6" name="Picture 5"/>
+          <p:cNvPr id="7" name="Picture 6"/>
           <p:cNvPicPr>
             <a:picLocks noChangeAspect="1"/>
           </p:cNvPicPr>
@@ -13347,8 +13347,8 @@
         </p:blipFill>
         <p:spPr>
           <a:xfrm>
-            <a:off x="425327" y="1681025"/>
-            <a:ext cx="11503611" cy="4055686"/>
+            <a:off x="179449" y="1772652"/>
+            <a:ext cx="11860149" cy="4134731"/>
           </a:xfrm>
           <a:prstGeom prst="rect">
             <a:avLst/>

</xml_diff>